<commit_message>
Updates to prepare for ballot.
</commit_message>
<xml_diff>
--- a/input/images-source/ATRIGDiagrams.pptx
+++ b/input/images-source/ATRIGDiagrams.pptx
@@ -5,13 +5,14 @@
     <p:sldMasterId id="2147483648" r:id="rId1"/>
   </p:sldMasterIdLst>
   <p:notesMasterIdLst>
-    <p:notesMasterId r:id="rId6"/>
+    <p:notesMasterId r:id="rId7"/>
   </p:notesMasterIdLst>
   <p:sldIdLst>
     <p:sldId id="1081" r:id="rId2"/>
     <p:sldId id="1047" r:id="rId3"/>
     <p:sldId id="1051" r:id="rId4"/>
     <p:sldId id="1062" r:id="rId5"/>
+    <p:sldId id="257" r:id="rId6"/>
   </p:sldIdLst>
   <p:sldSz cx="12192000" cy="6858000"/>
   <p:notesSz cx="6858000" cy="9144000"/>
@@ -200,7 +201,7 @@
           <a:p>
             <a:fld id="{FA81AC3B-641A-DF48-8AC5-2382FC098B29}" type="datetimeFigureOut">
               <a:rPr lang="en-US" smtClean="0"/>
-              <a:t>12/16/20</a:t>
+              <a:t>11/9/22</a:t>
             </a:fld>
             <a:endParaRPr lang="en-US"/>
           </a:p>
@@ -973,7 +974,7 @@
           <a:p>
             <a:fld id="{553414A8-8F46-9346-92D1-82F4F6D69100}" type="datetimeFigureOut">
               <a:rPr lang="en-US" smtClean="0"/>
-              <a:t>12/16/20</a:t>
+              <a:t>11/9/22</a:t>
             </a:fld>
             <a:endParaRPr lang="en-US"/>
           </a:p>
@@ -1171,7 +1172,7 @@
           <a:p>
             <a:fld id="{553414A8-8F46-9346-92D1-82F4F6D69100}" type="datetimeFigureOut">
               <a:rPr lang="en-US" smtClean="0"/>
-              <a:t>12/16/20</a:t>
+              <a:t>11/9/22</a:t>
             </a:fld>
             <a:endParaRPr lang="en-US"/>
           </a:p>
@@ -1379,7 +1380,7 @@
           <a:p>
             <a:fld id="{553414A8-8F46-9346-92D1-82F4F6D69100}" type="datetimeFigureOut">
               <a:rPr lang="en-US" smtClean="0"/>
-              <a:t>12/16/20</a:t>
+              <a:t>11/9/22</a:t>
             </a:fld>
             <a:endParaRPr lang="en-US"/>
           </a:p>
@@ -2048,7 +2049,7 @@
           <a:p>
             <a:fld id="{553414A8-8F46-9346-92D1-82F4F6D69100}" type="datetimeFigureOut">
               <a:rPr lang="en-US" smtClean="0"/>
-              <a:t>12/16/20</a:t>
+              <a:t>11/9/22</a:t>
             </a:fld>
             <a:endParaRPr lang="en-US"/>
           </a:p>
@@ -2323,7 +2324,7 @@
           <a:p>
             <a:fld id="{553414A8-8F46-9346-92D1-82F4F6D69100}" type="datetimeFigureOut">
               <a:rPr lang="en-US" smtClean="0"/>
-              <a:t>12/16/20</a:t>
+              <a:t>11/9/22</a:t>
             </a:fld>
             <a:endParaRPr lang="en-US"/>
           </a:p>
@@ -2588,7 +2589,7 @@
           <a:p>
             <a:fld id="{553414A8-8F46-9346-92D1-82F4F6D69100}" type="datetimeFigureOut">
               <a:rPr lang="en-US" smtClean="0"/>
-              <a:t>12/16/20</a:t>
+              <a:t>11/9/22</a:t>
             </a:fld>
             <a:endParaRPr lang="en-US"/>
           </a:p>
@@ -3000,7 +3001,7 @@
           <a:p>
             <a:fld id="{553414A8-8F46-9346-92D1-82F4F6D69100}" type="datetimeFigureOut">
               <a:rPr lang="en-US" smtClean="0"/>
-              <a:t>12/16/20</a:t>
+              <a:t>11/9/22</a:t>
             </a:fld>
             <a:endParaRPr lang="en-US"/>
           </a:p>
@@ -3141,7 +3142,7 @@
           <a:p>
             <a:fld id="{553414A8-8F46-9346-92D1-82F4F6D69100}" type="datetimeFigureOut">
               <a:rPr lang="en-US" smtClean="0"/>
-              <a:t>12/16/20</a:t>
+              <a:t>11/9/22</a:t>
             </a:fld>
             <a:endParaRPr lang="en-US"/>
           </a:p>
@@ -3254,7 +3255,7 @@
           <a:p>
             <a:fld id="{553414A8-8F46-9346-92D1-82F4F6D69100}" type="datetimeFigureOut">
               <a:rPr lang="en-US" smtClean="0"/>
-              <a:t>12/16/20</a:t>
+              <a:t>11/9/22</a:t>
             </a:fld>
             <a:endParaRPr lang="en-US"/>
           </a:p>
@@ -3565,7 +3566,7 @@
           <a:p>
             <a:fld id="{553414A8-8F46-9346-92D1-82F4F6D69100}" type="datetimeFigureOut">
               <a:rPr lang="en-US" smtClean="0"/>
-              <a:t>12/16/20</a:t>
+              <a:t>11/9/22</a:t>
             </a:fld>
             <a:endParaRPr lang="en-US"/>
           </a:p>
@@ -3853,7 +3854,7 @@
           <a:p>
             <a:fld id="{553414A8-8F46-9346-92D1-82F4F6D69100}" type="datetimeFigureOut">
               <a:rPr lang="en-US" smtClean="0"/>
-              <a:t>12/16/20</a:t>
+              <a:t>11/9/22</a:t>
             </a:fld>
             <a:endParaRPr lang="en-US"/>
           </a:p>
@@ -4094,7 +4095,7 @@
           <a:p>
             <a:fld id="{553414A8-8F46-9346-92D1-82F4F6D69100}" type="datetimeFigureOut">
               <a:rPr lang="en-US" smtClean="0"/>
-              <a:t>12/16/20</a:t>
+              <a:t>11/9/22</a:t>
             </a:fld>
             <a:endParaRPr lang="en-US"/>
           </a:p>
@@ -10725,6 +10726,1788 @@
     <p:extLst>
       <p:ext uri="{BB962C8B-B14F-4D97-AF65-F5344CB8AC3E}">
         <p14:creationId xmlns:p14="http://schemas.microsoft.com/office/powerpoint/2010/main" val="3974957695"/>
+      </p:ext>
+    </p:extLst>
+  </p:cSld>
+  <p:clrMapOvr>
+    <a:masterClrMapping/>
+  </p:clrMapOvr>
+</p:sld>
+</file>
+
+<file path=ppt/slides/slide5.xml><?xml version="1.0" encoding="utf-8"?>
+<p:sld xmlns:a="http://schemas.openxmlformats.org/drawingml/2006/main" xmlns:r="http://schemas.openxmlformats.org/officeDocument/2006/relationships" xmlns:p="http://schemas.openxmlformats.org/presentationml/2006/main">
+  <p:cSld>
+    <p:spTree>
+      <p:nvGrpSpPr>
+        <p:cNvPr id="1" name=""/>
+        <p:cNvGrpSpPr/>
+        <p:nvPr/>
+      </p:nvGrpSpPr>
+      <p:grpSpPr>
+        <a:xfrm>
+          <a:off x="0" y="0"/>
+          <a:ext cx="0" cy="0"/>
+          <a:chOff x="0" y="0"/>
+          <a:chExt cx="0" cy="0"/>
+        </a:xfrm>
+      </p:grpSpPr>
+      <p:sp>
+        <p:nvSpPr>
+          <p:cNvPr id="4" name="Rounded Rectangle 3">
+            <a:extLst>
+              <a:ext uri="{FF2B5EF4-FFF2-40B4-BE49-F238E27FC236}">
+                <a16:creationId xmlns:a16="http://schemas.microsoft.com/office/drawing/2014/main" id="{303C602C-D662-FB3D-B162-3FAEB600EB3D}"/>
+              </a:ext>
+            </a:extLst>
+          </p:cNvPr>
+          <p:cNvSpPr/>
+          <p:nvPr/>
+        </p:nvSpPr>
+        <p:spPr>
+          <a:xfrm>
+            <a:off x="2235199" y="697423"/>
+            <a:ext cx="2669191" cy="4957389"/>
+          </a:xfrm>
+          <a:prstGeom prst="roundRect">
+            <a:avLst/>
+          </a:prstGeom>
+          <a:noFill/>
+        </p:spPr>
+        <p:style>
+          <a:lnRef idx="2">
+            <a:schemeClr val="accent1">
+              <a:shade val="50000"/>
+            </a:schemeClr>
+          </a:lnRef>
+          <a:fillRef idx="1">
+            <a:schemeClr val="accent1"/>
+          </a:fillRef>
+          <a:effectRef idx="0">
+            <a:schemeClr val="accent1"/>
+          </a:effectRef>
+          <a:fontRef idx="minor">
+            <a:schemeClr val="lt1"/>
+          </a:fontRef>
+        </p:style>
+        <p:txBody>
+          <a:bodyPr rtlCol="0" anchor="ctr"/>
+          <a:lstStyle/>
+          <a:p>
+            <a:pPr algn="ctr"/>
+            <a:endParaRPr lang="en-US" sz="1400"/>
+          </a:p>
+        </p:txBody>
+      </p:sp>
+      <p:sp>
+        <p:nvSpPr>
+          <p:cNvPr id="5" name="Rounded Rectangle 4">
+            <a:extLst>
+              <a:ext uri="{FF2B5EF4-FFF2-40B4-BE49-F238E27FC236}">
+                <a16:creationId xmlns:a16="http://schemas.microsoft.com/office/drawing/2014/main" id="{979E6C8C-722C-AE9A-F9B2-1588EC66ADBA}"/>
+              </a:ext>
+            </a:extLst>
+          </p:cNvPr>
+          <p:cNvSpPr/>
+          <p:nvPr/>
+        </p:nvSpPr>
+        <p:spPr>
+          <a:xfrm>
+            <a:off x="7435850" y="809259"/>
+            <a:ext cx="4552950" cy="4845554"/>
+          </a:xfrm>
+          <a:prstGeom prst="roundRect">
+            <a:avLst/>
+          </a:prstGeom>
+          <a:noFill/>
+        </p:spPr>
+        <p:style>
+          <a:lnRef idx="2">
+            <a:schemeClr val="accent1">
+              <a:shade val="50000"/>
+            </a:schemeClr>
+          </a:lnRef>
+          <a:fillRef idx="1">
+            <a:schemeClr val="accent1"/>
+          </a:fillRef>
+          <a:effectRef idx="0">
+            <a:schemeClr val="accent1"/>
+          </a:effectRef>
+          <a:fontRef idx="minor">
+            <a:schemeClr val="lt1"/>
+          </a:fontRef>
+        </p:style>
+        <p:txBody>
+          <a:bodyPr rtlCol="0" anchor="ctr"/>
+          <a:lstStyle/>
+          <a:p>
+            <a:pPr algn="ctr"/>
+            <a:endParaRPr lang="en-US" sz="1400"/>
+          </a:p>
+        </p:txBody>
+      </p:sp>
+      <p:cxnSp>
+        <p:nvCxnSpPr>
+          <p:cNvPr id="6" name="Connector: Elbow 48">
+            <a:extLst>
+              <a:ext uri="{FF2B5EF4-FFF2-40B4-BE49-F238E27FC236}">
+                <a16:creationId xmlns:a16="http://schemas.microsoft.com/office/drawing/2014/main" id="{3E7F76B9-5243-E2BA-5FC4-9F892FE5B5EE}"/>
+              </a:ext>
+            </a:extLst>
+          </p:cNvPr>
+          <p:cNvCxnSpPr>
+            <a:cxnSpLocks/>
+          </p:cNvCxnSpPr>
+          <p:nvPr/>
+        </p:nvCxnSpPr>
+        <p:spPr>
+          <a:xfrm flipV="1">
+            <a:off x="4889500" y="1311053"/>
+            <a:ext cx="2546350" cy="48878"/>
+          </a:xfrm>
+          <a:prstGeom prst="bentConnector3">
+            <a:avLst/>
+          </a:prstGeom>
+          <a:ln w="9525" cap="flat" cmpd="sng" algn="ctr">
+            <a:solidFill>
+              <a:schemeClr val="accent1"/>
+            </a:solidFill>
+            <a:prstDash val="solid"/>
+            <a:round/>
+            <a:headEnd type="arrow" w="med" len="med"/>
+            <a:tailEnd type="arrow" w="med" len="med"/>
+          </a:ln>
+        </p:spPr>
+        <p:style>
+          <a:lnRef idx="0">
+            <a:scrgbClr r="0" g="0" b="0"/>
+          </a:lnRef>
+          <a:fillRef idx="0">
+            <a:scrgbClr r="0" g="0" b="0"/>
+          </a:fillRef>
+          <a:effectRef idx="0">
+            <a:scrgbClr r="0" g="0" b="0"/>
+          </a:effectRef>
+          <a:fontRef idx="minor">
+            <a:schemeClr val="tx1"/>
+          </a:fontRef>
+        </p:style>
+      </p:cxnSp>
+      <p:sp>
+        <p:nvSpPr>
+          <p:cNvPr id="7" name="TextBox 6">
+            <a:extLst>
+              <a:ext uri="{FF2B5EF4-FFF2-40B4-BE49-F238E27FC236}">
+                <a16:creationId xmlns:a16="http://schemas.microsoft.com/office/drawing/2014/main" id="{64E5E790-7161-4575-65B3-FADF7CFF0BD0}"/>
+              </a:ext>
+            </a:extLst>
+          </p:cNvPr>
+          <p:cNvSpPr txBox="1"/>
+          <p:nvPr/>
+        </p:nvSpPr>
+        <p:spPr>
+          <a:xfrm>
+            <a:off x="4976462" y="614037"/>
+            <a:ext cx="2280434" cy="769441"/>
+          </a:xfrm>
+          <a:prstGeom prst="rect">
+            <a:avLst/>
+          </a:prstGeom>
+          <a:noFill/>
+        </p:spPr>
+        <p:txBody>
+          <a:bodyPr wrap="square" rtlCol="0">
+            <a:spAutoFit/>
+          </a:bodyPr>
+          <a:lstStyle/>
+          <a:p>
+            <a:r>
+              <a:rPr lang="en-US" sz="1100" dirty="0"/>
+              <a:t>Producer/Consumer enter relationship and agree on attribution method and need for a list</a:t>
+            </a:r>
+          </a:p>
+        </p:txBody>
+      </p:sp>
+      <p:sp>
+        <p:nvSpPr>
+          <p:cNvPr id="8" name="Oval 7">
+            <a:extLst>
+              <a:ext uri="{FF2B5EF4-FFF2-40B4-BE49-F238E27FC236}">
+                <a16:creationId xmlns:a16="http://schemas.microsoft.com/office/drawing/2014/main" id="{018D6A02-0080-E8BC-D560-C14D87B3BF3E}"/>
+              </a:ext>
+            </a:extLst>
+          </p:cNvPr>
+          <p:cNvSpPr/>
+          <p:nvPr/>
+        </p:nvSpPr>
+        <p:spPr>
+          <a:xfrm>
+            <a:off x="5970678" y="1153466"/>
+            <a:ext cx="277594" cy="311476"/>
+          </a:xfrm>
+          <a:prstGeom prst="ellipse">
+            <a:avLst/>
+          </a:prstGeom>
+          <a:solidFill>
+            <a:srgbClr val="FFFF00"/>
+          </a:solidFill>
+        </p:spPr>
+        <p:style>
+          <a:lnRef idx="2">
+            <a:schemeClr val="accent1">
+              <a:shade val="50000"/>
+            </a:schemeClr>
+          </a:lnRef>
+          <a:fillRef idx="1">
+            <a:schemeClr val="accent1"/>
+          </a:fillRef>
+          <a:effectRef idx="0">
+            <a:schemeClr val="accent1"/>
+          </a:effectRef>
+          <a:fontRef idx="minor">
+            <a:schemeClr val="lt1"/>
+          </a:fontRef>
+        </p:style>
+        <p:txBody>
+          <a:bodyPr rtlCol="0" anchor="ctr"/>
+          <a:lstStyle/>
+          <a:p>
+            <a:pPr algn="ctr"/>
+            <a:r>
+              <a:rPr lang="en-US" sz="1400" dirty="0">
+                <a:solidFill>
+                  <a:schemeClr val="tx1"/>
+                </a:solidFill>
+              </a:rPr>
+              <a:t>1</a:t>
+            </a:r>
+          </a:p>
+        </p:txBody>
+      </p:sp>
+      <p:sp>
+        <p:nvSpPr>
+          <p:cNvPr id="9" name="Rounded Rectangle 8">
+            <a:extLst>
+              <a:ext uri="{FF2B5EF4-FFF2-40B4-BE49-F238E27FC236}">
+                <a16:creationId xmlns:a16="http://schemas.microsoft.com/office/drawing/2014/main" id="{9891B6EC-1568-B811-C054-8DACBC57C304}"/>
+              </a:ext>
+            </a:extLst>
+          </p:cNvPr>
+          <p:cNvSpPr/>
+          <p:nvPr/>
+        </p:nvSpPr>
+        <p:spPr>
+          <a:xfrm>
+            <a:off x="7797800" y="1456559"/>
+            <a:ext cx="4010172" cy="705754"/>
+          </a:xfrm>
+          <a:prstGeom prst="roundRect">
+            <a:avLst/>
+          </a:prstGeom>
+          <a:noFill/>
+        </p:spPr>
+        <p:style>
+          <a:lnRef idx="2">
+            <a:schemeClr val="accent1">
+              <a:shade val="50000"/>
+            </a:schemeClr>
+          </a:lnRef>
+          <a:fillRef idx="1">
+            <a:schemeClr val="accent1"/>
+          </a:fillRef>
+          <a:effectRef idx="0">
+            <a:schemeClr val="accent1"/>
+          </a:effectRef>
+          <a:fontRef idx="minor">
+            <a:schemeClr val="lt1"/>
+          </a:fontRef>
+        </p:style>
+        <p:txBody>
+          <a:bodyPr rtlCol="0" anchor="ctr"/>
+          <a:lstStyle/>
+          <a:p>
+            <a:pPr algn="ctr"/>
+            <a:endParaRPr lang="en-US" sz="1400"/>
+          </a:p>
+        </p:txBody>
+      </p:sp>
+      <p:sp>
+        <p:nvSpPr>
+          <p:cNvPr id="10" name="TextBox 9">
+            <a:extLst>
+              <a:ext uri="{FF2B5EF4-FFF2-40B4-BE49-F238E27FC236}">
+                <a16:creationId xmlns:a16="http://schemas.microsoft.com/office/drawing/2014/main" id="{10B2B90E-EBEF-8F47-9958-F02E56EF9A0B}"/>
+              </a:ext>
+            </a:extLst>
+          </p:cNvPr>
+          <p:cNvSpPr txBox="1"/>
+          <p:nvPr/>
+        </p:nvSpPr>
+        <p:spPr>
+          <a:xfrm>
+            <a:off x="3014286" y="930541"/>
+            <a:ext cx="1127108" cy="307777"/>
+          </a:xfrm>
+          <a:prstGeom prst="rect">
+            <a:avLst/>
+          </a:prstGeom>
+          <a:noFill/>
+        </p:spPr>
+        <p:txBody>
+          <a:bodyPr wrap="square" rtlCol="0">
+            <a:spAutoFit/>
+          </a:bodyPr>
+          <a:lstStyle/>
+          <a:p>
+            <a:r>
+              <a:rPr lang="en-US" sz="1400" dirty="0"/>
+              <a:t>Producer</a:t>
+            </a:r>
+          </a:p>
+        </p:txBody>
+      </p:sp>
+      <p:sp>
+        <p:nvSpPr>
+          <p:cNvPr id="11" name="TextBox 10">
+            <a:extLst>
+              <a:ext uri="{FF2B5EF4-FFF2-40B4-BE49-F238E27FC236}">
+                <a16:creationId xmlns:a16="http://schemas.microsoft.com/office/drawing/2014/main" id="{B8140675-0670-D154-CC7D-3FFF07DADAD6}"/>
+              </a:ext>
+            </a:extLst>
+          </p:cNvPr>
+          <p:cNvSpPr txBox="1"/>
+          <p:nvPr/>
+        </p:nvSpPr>
+        <p:spPr>
+          <a:xfrm>
+            <a:off x="9027384" y="898694"/>
+            <a:ext cx="1256067" cy="307777"/>
+          </a:xfrm>
+          <a:prstGeom prst="rect">
+            <a:avLst/>
+          </a:prstGeom>
+          <a:noFill/>
+        </p:spPr>
+        <p:txBody>
+          <a:bodyPr wrap="square" rtlCol="0">
+            <a:spAutoFit/>
+          </a:bodyPr>
+          <a:lstStyle/>
+          <a:p>
+            <a:r>
+              <a:rPr lang="en-US" sz="1400" dirty="0"/>
+              <a:t>Consumer</a:t>
+            </a:r>
+          </a:p>
+        </p:txBody>
+      </p:sp>
+      <p:sp>
+        <p:nvSpPr>
+          <p:cNvPr id="12" name="TextBox 11">
+            <a:extLst>
+              <a:ext uri="{FF2B5EF4-FFF2-40B4-BE49-F238E27FC236}">
+                <a16:creationId xmlns:a16="http://schemas.microsoft.com/office/drawing/2014/main" id="{EDFEFCD0-532C-AEEE-EC45-3425D6700B36}"/>
+              </a:ext>
+            </a:extLst>
+          </p:cNvPr>
+          <p:cNvSpPr txBox="1"/>
+          <p:nvPr/>
+        </p:nvSpPr>
+        <p:spPr>
+          <a:xfrm>
+            <a:off x="7947025" y="1519448"/>
+            <a:ext cx="3732397" cy="430887"/>
+          </a:xfrm>
+          <a:prstGeom prst="rect">
+            <a:avLst/>
+          </a:prstGeom>
+          <a:noFill/>
+        </p:spPr>
+        <p:txBody>
+          <a:bodyPr wrap="square" rtlCol="0">
+            <a:spAutoFit/>
+          </a:bodyPr>
+          <a:lstStyle/>
+          <a:p>
+            <a:r>
+              <a:rPr lang="en-US" sz="1050" dirty="0"/>
+              <a:t>Consumer identifies list of patients attributed to them because of their relationship and services rendered</a:t>
+            </a:r>
+          </a:p>
+        </p:txBody>
+      </p:sp>
+      <p:sp>
+        <p:nvSpPr>
+          <p:cNvPr id="13" name="Rounded Rectangle 12">
+            <a:extLst>
+              <a:ext uri="{FF2B5EF4-FFF2-40B4-BE49-F238E27FC236}">
+                <a16:creationId xmlns:a16="http://schemas.microsoft.com/office/drawing/2014/main" id="{33FD47BB-CBEC-C4DF-7E3C-66A06AF97C1A}"/>
+              </a:ext>
+            </a:extLst>
+          </p:cNvPr>
+          <p:cNvSpPr/>
+          <p:nvPr/>
+        </p:nvSpPr>
+        <p:spPr>
+          <a:xfrm>
+            <a:off x="2385923" y="1533504"/>
+            <a:ext cx="2338825" cy="705754"/>
+          </a:xfrm>
+          <a:prstGeom prst="roundRect">
+            <a:avLst/>
+          </a:prstGeom>
+          <a:noFill/>
+        </p:spPr>
+        <p:style>
+          <a:lnRef idx="2">
+            <a:schemeClr val="accent1">
+              <a:shade val="50000"/>
+            </a:schemeClr>
+          </a:lnRef>
+          <a:fillRef idx="1">
+            <a:schemeClr val="accent1"/>
+          </a:fillRef>
+          <a:effectRef idx="0">
+            <a:schemeClr val="accent1"/>
+          </a:effectRef>
+          <a:fontRef idx="minor">
+            <a:schemeClr val="lt1"/>
+          </a:fontRef>
+        </p:style>
+        <p:txBody>
+          <a:bodyPr rtlCol="0" anchor="ctr"/>
+          <a:lstStyle/>
+          <a:p>
+            <a:pPr algn="ctr"/>
+            <a:endParaRPr lang="en-US" sz="1400"/>
+          </a:p>
+        </p:txBody>
+      </p:sp>
+      <p:sp>
+        <p:nvSpPr>
+          <p:cNvPr id="14" name="TextBox 13">
+            <a:extLst>
+              <a:ext uri="{FF2B5EF4-FFF2-40B4-BE49-F238E27FC236}">
+                <a16:creationId xmlns:a16="http://schemas.microsoft.com/office/drawing/2014/main" id="{F165E9E3-9C49-F122-57BF-08A84DE0B814}"/>
+              </a:ext>
+            </a:extLst>
+          </p:cNvPr>
+          <p:cNvSpPr txBox="1"/>
+          <p:nvPr/>
+        </p:nvSpPr>
+        <p:spPr>
+          <a:xfrm>
+            <a:off x="2535149" y="1598613"/>
+            <a:ext cx="2022736" cy="430887"/>
+          </a:xfrm>
+          <a:prstGeom prst="rect">
+            <a:avLst/>
+          </a:prstGeom>
+          <a:noFill/>
+        </p:spPr>
+        <p:txBody>
+          <a:bodyPr wrap="square" rtlCol="0">
+            <a:spAutoFit/>
+          </a:bodyPr>
+          <a:lstStyle/>
+          <a:p>
+            <a:r>
+              <a:rPr lang="en-US" sz="1050" dirty="0"/>
+              <a:t>Producer accepts list to be created and creates the list</a:t>
+            </a:r>
+          </a:p>
+        </p:txBody>
+      </p:sp>
+      <p:cxnSp>
+        <p:nvCxnSpPr>
+          <p:cNvPr id="15" name="Elbow Connector 14">
+            <a:extLst>
+              <a:ext uri="{FF2B5EF4-FFF2-40B4-BE49-F238E27FC236}">
+                <a16:creationId xmlns:a16="http://schemas.microsoft.com/office/drawing/2014/main" id="{E3B0D596-A6B2-0E84-FDEF-09D947AE6263}"/>
+              </a:ext>
+            </a:extLst>
+          </p:cNvPr>
+          <p:cNvCxnSpPr>
+            <a:stCxn id="9" idx="1"/>
+            <a:endCxn id="13" idx="3"/>
+          </p:cNvCxnSpPr>
+          <p:nvPr/>
+        </p:nvCxnSpPr>
+        <p:spPr>
+          <a:xfrm rot="10800000" flipV="1">
+            <a:off x="4724748" y="1809435"/>
+            <a:ext cx="3073052" cy="76945"/>
+          </a:xfrm>
+          <a:prstGeom prst="bentConnector3">
+            <a:avLst/>
+          </a:prstGeom>
+          <a:ln>
+            <a:tailEnd type="triangle"/>
+          </a:ln>
+        </p:spPr>
+        <p:style>
+          <a:lnRef idx="1">
+            <a:schemeClr val="accent1"/>
+          </a:lnRef>
+          <a:fillRef idx="0">
+            <a:schemeClr val="accent1"/>
+          </a:fillRef>
+          <a:effectRef idx="0">
+            <a:schemeClr val="accent1"/>
+          </a:effectRef>
+          <a:fontRef idx="minor">
+            <a:schemeClr val="tx1"/>
+          </a:fontRef>
+        </p:style>
+      </p:cxnSp>
+      <p:sp>
+        <p:nvSpPr>
+          <p:cNvPr id="16" name="Oval 15">
+            <a:extLst>
+              <a:ext uri="{FF2B5EF4-FFF2-40B4-BE49-F238E27FC236}">
+                <a16:creationId xmlns:a16="http://schemas.microsoft.com/office/drawing/2014/main" id="{67BCB149-F29D-5FAC-20E2-32CA44700F40}"/>
+              </a:ext>
+            </a:extLst>
+          </p:cNvPr>
+          <p:cNvSpPr/>
+          <p:nvPr/>
+        </p:nvSpPr>
+        <p:spPr>
+          <a:xfrm>
+            <a:off x="6024652" y="1677406"/>
+            <a:ext cx="277594" cy="311476"/>
+          </a:xfrm>
+          <a:prstGeom prst="ellipse">
+            <a:avLst/>
+          </a:prstGeom>
+          <a:solidFill>
+            <a:srgbClr val="FFFF00"/>
+          </a:solidFill>
+        </p:spPr>
+        <p:style>
+          <a:lnRef idx="2">
+            <a:schemeClr val="accent1">
+              <a:shade val="50000"/>
+            </a:schemeClr>
+          </a:lnRef>
+          <a:fillRef idx="1">
+            <a:schemeClr val="accent1"/>
+          </a:fillRef>
+          <a:effectRef idx="0">
+            <a:schemeClr val="accent1"/>
+          </a:effectRef>
+          <a:fontRef idx="minor">
+            <a:schemeClr val="lt1"/>
+          </a:fontRef>
+        </p:style>
+        <p:txBody>
+          <a:bodyPr rtlCol="0" anchor="ctr"/>
+          <a:lstStyle/>
+          <a:p>
+            <a:pPr algn="ctr"/>
+            <a:r>
+              <a:rPr lang="en-US" sz="1400" dirty="0">
+                <a:solidFill>
+                  <a:schemeClr val="tx1"/>
+                </a:solidFill>
+              </a:rPr>
+              <a:t>2</a:t>
+            </a:r>
+          </a:p>
+        </p:txBody>
+      </p:sp>
+      <p:sp>
+        <p:nvSpPr>
+          <p:cNvPr id="17" name="TextBox 16">
+            <a:extLst>
+              <a:ext uri="{FF2B5EF4-FFF2-40B4-BE49-F238E27FC236}">
+                <a16:creationId xmlns:a16="http://schemas.microsoft.com/office/drawing/2014/main" id="{1F95C9AA-ECE6-BF85-FDC9-A89A01C002C9}"/>
+              </a:ext>
+            </a:extLst>
+          </p:cNvPr>
+          <p:cNvSpPr txBox="1"/>
+          <p:nvPr/>
+        </p:nvSpPr>
+        <p:spPr>
+          <a:xfrm>
+            <a:off x="5093526" y="1835607"/>
+            <a:ext cx="2280434" cy="430887"/>
+          </a:xfrm>
+          <a:prstGeom prst="rect">
+            <a:avLst/>
+          </a:prstGeom>
+          <a:noFill/>
+        </p:spPr>
+        <p:txBody>
+          <a:bodyPr wrap="square" rtlCol="0">
+            <a:spAutoFit/>
+          </a:bodyPr>
+          <a:lstStyle/>
+          <a:p>
+            <a:r>
+              <a:rPr lang="en-US" sz="1100" dirty="0"/>
+              <a:t>Consumer creates the list in the Producer system</a:t>
+            </a:r>
+          </a:p>
+        </p:txBody>
+      </p:sp>
+      <p:grpSp>
+        <p:nvGrpSpPr>
+          <p:cNvPr id="18" name="Group 17">
+            <a:extLst>
+              <a:ext uri="{FF2B5EF4-FFF2-40B4-BE49-F238E27FC236}">
+                <a16:creationId xmlns:a16="http://schemas.microsoft.com/office/drawing/2014/main" id="{90BC3A53-83BD-F92D-A9EC-042C13075955}"/>
+              </a:ext>
+            </a:extLst>
+          </p:cNvPr>
+          <p:cNvGrpSpPr/>
+          <p:nvPr/>
+        </p:nvGrpSpPr>
+        <p:grpSpPr>
+          <a:xfrm>
+            <a:off x="2399461" y="2721620"/>
+            <a:ext cx="2338825" cy="422143"/>
+            <a:chOff x="1548561" y="3561521"/>
+            <a:chExt cx="2325777" cy="417129"/>
+          </a:xfrm>
+        </p:grpSpPr>
+        <p:sp>
+          <p:nvSpPr>
+            <p:cNvPr id="19" name="Rounded Rectangle 18">
+              <a:extLst>
+                <a:ext uri="{FF2B5EF4-FFF2-40B4-BE49-F238E27FC236}">
+                  <a16:creationId xmlns:a16="http://schemas.microsoft.com/office/drawing/2014/main" id="{EDD2DF36-1973-0885-B046-CBABE3EDF53F}"/>
+                </a:ext>
+              </a:extLst>
+            </p:cNvPr>
+            <p:cNvSpPr/>
+            <p:nvPr/>
+          </p:nvSpPr>
+          <p:spPr>
+            <a:xfrm>
+              <a:off x="1548561" y="3561521"/>
+              <a:ext cx="2325777" cy="417129"/>
+            </a:xfrm>
+            <a:prstGeom prst="roundRect">
+              <a:avLst/>
+            </a:prstGeom>
+            <a:noFill/>
+          </p:spPr>
+          <p:style>
+            <a:lnRef idx="2">
+              <a:schemeClr val="accent1">
+                <a:shade val="50000"/>
+              </a:schemeClr>
+            </a:lnRef>
+            <a:fillRef idx="1">
+              <a:schemeClr val="accent1"/>
+            </a:fillRef>
+            <a:effectRef idx="0">
+              <a:schemeClr val="accent1"/>
+            </a:effectRef>
+            <a:fontRef idx="minor">
+              <a:schemeClr val="lt1"/>
+            </a:fontRef>
+          </p:style>
+          <p:txBody>
+            <a:bodyPr rtlCol="0" anchor="ctr"/>
+            <a:lstStyle/>
+            <a:p>
+              <a:pPr algn="ctr"/>
+              <a:endParaRPr lang="en-US" sz="1400"/>
+            </a:p>
+          </p:txBody>
+        </p:sp>
+        <p:sp>
+          <p:nvSpPr>
+            <p:cNvPr id="20" name="TextBox 19">
+              <a:extLst>
+                <a:ext uri="{FF2B5EF4-FFF2-40B4-BE49-F238E27FC236}">
+                  <a16:creationId xmlns:a16="http://schemas.microsoft.com/office/drawing/2014/main" id="{08EF7EE6-8118-569D-1C04-C5844D6D5CF0}"/>
+                </a:ext>
+              </a:extLst>
+            </p:cNvPr>
+            <p:cNvSpPr txBox="1"/>
+            <p:nvPr/>
+          </p:nvSpPr>
+          <p:spPr>
+            <a:xfrm>
+              <a:off x="1705723" y="3628144"/>
+              <a:ext cx="2011452" cy="258503"/>
+            </a:xfrm>
+            <a:prstGeom prst="rect">
+              <a:avLst/>
+            </a:prstGeom>
+            <a:noFill/>
+          </p:spPr>
+          <p:txBody>
+            <a:bodyPr wrap="square" rtlCol="0">
+              <a:spAutoFit/>
+            </a:bodyPr>
+            <a:lstStyle/>
+            <a:p>
+              <a:r>
+                <a:rPr lang="en-US" sz="1050" dirty="0"/>
+                <a:t>Producer adjusts the list </a:t>
+              </a:r>
+            </a:p>
+          </p:txBody>
+        </p:sp>
+      </p:grpSp>
+      <p:cxnSp>
+        <p:nvCxnSpPr>
+          <p:cNvPr id="21" name="Straight Arrow Connector 20">
+            <a:extLst>
+              <a:ext uri="{FF2B5EF4-FFF2-40B4-BE49-F238E27FC236}">
+                <a16:creationId xmlns:a16="http://schemas.microsoft.com/office/drawing/2014/main" id="{E74944C6-7A4E-E106-FEE3-B87A499EE101}"/>
+              </a:ext>
+            </a:extLst>
+          </p:cNvPr>
+          <p:cNvCxnSpPr>
+            <a:cxnSpLocks/>
+            <a:stCxn id="13" idx="2"/>
+            <a:endCxn id="19" idx="0"/>
+          </p:cNvCxnSpPr>
+          <p:nvPr/>
+        </p:nvCxnSpPr>
+        <p:spPr>
+          <a:xfrm>
+            <a:off x="3555336" y="2239258"/>
+            <a:ext cx="13538" cy="482362"/>
+          </a:xfrm>
+          <a:prstGeom prst="straightConnector1">
+            <a:avLst/>
+          </a:prstGeom>
+          <a:ln>
+            <a:tailEnd type="triangle"/>
+          </a:ln>
+        </p:spPr>
+        <p:style>
+          <a:lnRef idx="1">
+            <a:schemeClr val="accent1"/>
+          </a:lnRef>
+          <a:fillRef idx="0">
+            <a:schemeClr val="accent1"/>
+          </a:fillRef>
+          <a:effectRef idx="0">
+            <a:schemeClr val="accent1"/>
+          </a:effectRef>
+          <a:fontRef idx="minor">
+            <a:schemeClr val="tx1"/>
+          </a:fontRef>
+        </p:style>
+      </p:cxnSp>
+      <p:grpSp>
+        <p:nvGrpSpPr>
+          <p:cNvPr id="22" name="Group 21">
+            <a:extLst>
+              <a:ext uri="{FF2B5EF4-FFF2-40B4-BE49-F238E27FC236}">
+                <a16:creationId xmlns:a16="http://schemas.microsoft.com/office/drawing/2014/main" id="{31CCFA69-8FDF-4621-F34E-717FBC932FC4}"/>
+              </a:ext>
+            </a:extLst>
+          </p:cNvPr>
+          <p:cNvGrpSpPr/>
+          <p:nvPr/>
+        </p:nvGrpSpPr>
+        <p:grpSpPr>
+          <a:xfrm>
+            <a:off x="7797800" y="2656621"/>
+            <a:ext cx="4010172" cy="422143"/>
+            <a:chOff x="1548561" y="3561521"/>
+            <a:chExt cx="3987800" cy="417129"/>
+          </a:xfrm>
+        </p:grpSpPr>
+        <p:sp>
+          <p:nvSpPr>
+            <p:cNvPr id="23" name="Rounded Rectangle 22">
+              <a:extLst>
+                <a:ext uri="{FF2B5EF4-FFF2-40B4-BE49-F238E27FC236}">
+                  <a16:creationId xmlns:a16="http://schemas.microsoft.com/office/drawing/2014/main" id="{143C1E40-4B3B-5706-6E13-E0786277ACD3}"/>
+                </a:ext>
+              </a:extLst>
+            </p:cNvPr>
+            <p:cNvSpPr/>
+            <p:nvPr/>
+          </p:nvSpPr>
+          <p:spPr>
+            <a:xfrm>
+              <a:off x="1548561" y="3561521"/>
+              <a:ext cx="3987800" cy="417129"/>
+            </a:xfrm>
+            <a:prstGeom prst="roundRect">
+              <a:avLst/>
+            </a:prstGeom>
+            <a:noFill/>
+          </p:spPr>
+          <p:style>
+            <a:lnRef idx="2">
+              <a:schemeClr val="accent1">
+                <a:shade val="50000"/>
+              </a:schemeClr>
+            </a:lnRef>
+            <a:fillRef idx="1">
+              <a:schemeClr val="accent1"/>
+            </a:fillRef>
+            <a:effectRef idx="0">
+              <a:schemeClr val="accent1"/>
+            </a:effectRef>
+            <a:fontRef idx="minor">
+              <a:schemeClr val="lt1"/>
+            </a:fontRef>
+          </p:style>
+          <p:txBody>
+            <a:bodyPr rtlCol="0" anchor="ctr"/>
+            <a:lstStyle/>
+            <a:p>
+              <a:pPr algn="ctr"/>
+              <a:endParaRPr lang="en-US" sz="1400"/>
+            </a:p>
+          </p:txBody>
+        </p:sp>
+        <p:sp>
+          <p:nvSpPr>
+            <p:cNvPr id="24" name="TextBox 23">
+              <a:extLst>
+                <a:ext uri="{FF2B5EF4-FFF2-40B4-BE49-F238E27FC236}">
+                  <a16:creationId xmlns:a16="http://schemas.microsoft.com/office/drawing/2014/main" id="{94C3AEE8-E843-09B5-7410-74EA279D5C04}"/>
+                </a:ext>
+              </a:extLst>
+            </p:cNvPr>
+            <p:cNvSpPr txBox="1"/>
+            <p:nvPr/>
+          </p:nvSpPr>
+          <p:spPr>
+            <a:xfrm>
+              <a:off x="1705722" y="3628144"/>
+              <a:ext cx="3668713" cy="258503"/>
+            </a:xfrm>
+            <a:prstGeom prst="rect">
+              <a:avLst/>
+            </a:prstGeom>
+            <a:noFill/>
+          </p:spPr>
+          <p:txBody>
+            <a:bodyPr wrap="square" rtlCol="0">
+              <a:spAutoFit/>
+            </a:bodyPr>
+            <a:lstStyle/>
+            <a:p>
+              <a:r>
+                <a:rPr lang="en-US" sz="1050" dirty="0"/>
+                <a:t>Notify consumer of changes in the Attribution List</a:t>
+              </a:r>
+            </a:p>
+          </p:txBody>
+        </p:sp>
+      </p:grpSp>
+      <p:cxnSp>
+        <p:nvCxnSpPr>
+          <p:cNvPr id="25" name="Elbow Connector 24">
+            <a:extLst>
+              <a:ext uri="{FF2B5EF4-FFF2-40B4-BE49-F238E27FC236}">
+                <a16:creationId xmlns:a16="http://schemas.microsoft.com/office/drawing/2014/main" id="{035A50C1-82B1-BB4C-D725-C6B30B6BEB90}"/>
+              </a:ext>
+            </a:extLst>
+          </p:cNvPr>
+          <p:cNvCxnSpPr>
+            <a:cxnSpLocks/>
+            <a:stCxn id="19" idx="3"/>
+            <a:endCxn id="23" idx="1"/>
+          </p:cNvCxnSpPr>
+          <p:nvPr/>
+        </p:nvCxnSpPr>
+        <p:spPr>
+          <a:xfrm flipV="1">
+            <a:off x="4738286" y="2867693"/>
+            <a:ext cx="3059514" cy="64999"/>
+          </a:xfrm>
+          <a:prstGeom prst="bentConnector3">
+            <a:avLst>
+              <a:gd name="adj1" fmla="val 50000"/>
+            </a:avLst>
+          </a:prstGeom>
+          <a:ln>
+            <a:tailEnd type="triangle"/>
+          </a:ln>
+        </p:spPr>
+        <p:style>
+          <a:lnRef idx="1">
+            <a:schemeClr val="accent1"/>
+          </a:lnRef>
+          <a:fillRef idx="0">
+            <a:schemeClr val="accent1"/>
+          </a:fillRef>
+          <a:effectRef idx="0">
+            <a:schemeClr val="accent1"/>
+          </a:effectRef>
+          <a:fontRef idx="minor">
+            <a:schemeClr val="tx1"/>
+          </a:fontRef>
+        </p:style>
+      </p:cxnSp>
+      <p:grpSp>
+        <p:nvGrpSpPr>
+          <p:cNvPr id="26" name="Group 25">
+            <a:extLst>
+              <a:ext uri="{FF2B5EF4-FFF2-40B4-BE49-F238E27FC236}">
+                <a16:creationId xmlns:a16="http://schemas.microsoft.com/office/drawing/2014/main" id="{3D243BAB-0AE2-E146-7C2A-D6D64470D9FB}"/>
+              </a:ext>
+            </a:extLst>
+          </p:cNvPr>
+          <p:cNvGrpSpPr/>
+          <p:nvPr/>
+        </p:nvGrpSpPr>
+        <p:grpSpPr>
+          <a:xfrm>
+            <a:off x="7808912" y="3558646"/>
+            <a:ext cx="4010172" cy="690908"/>
+            <a:chOff x="1548561" y="3561521"/>
+            <a:chExt cx="3987800" cy="682702"/>
+          </a:xfrm>
+        </p:grpSpPr>
+        <p:sp>
+          <p:nvSpPr>
+            <p:cNvPr id="27" name="Rounded Rectangle 26">
+              <a:extLst>
+                <a:ext uri="{FF2B5EF4-FFF2-40B4-BE49-F238E27FC236}">
+                  <a16:creationId xmlns:a16="http://schemas.microsoft.com/office/drawing/2014/main" id="{555979FF-86E6-EB6B-C2BB-09B7190E9C9B}"/>
+                </a:ext>
+              </a:extLst>
+            </p:cNvPr>
+            <p:cNvSpPr/>
+            <p:nvPr/>
+          </p:nvSpPr>
+          <p:spPr>
+            <a:xfrm>
+              <a:off x="1548561" y="3561521"/>
+              <a:ext cx="3987800" cy="682702"/>
+            </a:xfrm>
+            <a:prstGeom prst="roundRect">
+              <a:avLst/>
+            </a:prstGeom>
+            <a:noFill/>
+          </p:spPr>
+          <p:style>
+            <a:lnRef idx="2">
+              <a:schemeClr val="accent1">
+                <a:shade val="50000"/>
+              </a:schemeClr>
+            </a:lnRef>
+            <a:fillRef idx="1">
+              <a:schemeClr val="accent1"/>
+            </a:fillRef>
+            <a:effectRef idx="0">
+              <a:schemeClr val="accent1"/>
+            </a:effectRef>
+            <a:fontRef idx="minor">
+              <a:schemeClr val="lt1"/>
+            </a:fontRef>
+          </p:style>
+          <p:txBody>
+            <a:bodyPr rtlCol="0" anchor="ctr"/>
+            <a:lstStyle/>
+            <a:p>
+              <a:pPr algn="ctr"/>
+              <a:endParaRPr lang="en-US" sz="1400"/>
+            </a:p>
+          </p:txBody>
+        </p:sp>
+        <p:sp>
+          <p:nvSpPr>
+            <p:cNvPr id="28" name="TextBox 27">
+              <a:extLst>
+                <a:ext uri="{FF2B5EF4-FFF2-40B4-BE49-F238E27FC236}">
+                  <a16:creationId xmlns:a16="http://schemas.microsoft.com/office/drawing/2014/main" id="{D696EC09-FCDF-D964-64AD-EA21A170ED48}"/>
+                </a:ext>
+              </a:extLst>
+            </p:cNvPr>
+            <p:cNvSpPr txBox="1"/>
+            <p:nvPr/>
+          </p:nvSpPr>
+          <p:spPr>
+            <a:xfrm>
+              <a:off x="1705722" y="3628144"/>
+              <a:ext cx="3668713" cy="250900"/>
+            </a:xfrm>
+            <a:prstGeom prst="rect">
+              <a:avLst/>
+            </a:prstGeom>
+            <a:noFill/>
+          </p:spPr>
+          <p:txBody>
+            <a:bodyPr wrap="square" rtlCol="0">
+              <a:spAutoFit/>
+            </a:bodyPr>
+            <a:lstStyle/>
+            <a:p>
+              <a:r>
+                <a:rPr lang="en-US" sz="1050" dirty="0"/>
+                <a:t>Identify changes to the Attribution List (Add/Modify/Delete)</a:t>
+              </a:r>
+            </a:p>
+          </p:txBody>
+        </p:sp>
+      </p:grpSp>
+      <p:cxnSp>
+        <p:nvCxnSpPr>
+          <p:cNvPr id="29" name="Straight Arrow Connector 28">
+            <a:extLst>
+              <a:ext uri="{FF2B5EF4-FFF2-40B4-BE49-F238E27FC236}">
+                <a16:creationId xmlns:a16="http://schemas.microsoft.com/office/drawing/2014/main" id="{FDD06BE1-27BA-C5F3-2B05-96FC61F50AAB}"/>
+              </a:ext>
+            </a:extLst>
+          </p:cNvPr>
+          <p:cNvCxnSpPr>
+            <a:cxnSpLocks/>
+            <a:stCxn id="23" idx="2"/>
+            <a:endCxn id="27" idx="0"/>
+          </p:cNvCxnSpPr>
+          <p:nvPr/>
+        </p:nvCxnSpPr>
+        <p:spPr>
+          <a:xfrm>
+            <a:off x="9802886" y="3078764"/>
+            <a:ext cx="11112" cy="479882"/>
+          </a:xfrm>
+          <a:prstGeom prst="straightConnector1">
+            <a:avLst/>
+          </a:prstGeom>
+          <a:ln>
+            <a:tailEnd type="triangle"/>
+          </a:ln>
+        </p:spPr>
+        <p:style>
+          <a:lnRef idx="1">
+            <a:schemeClr val="accent1"/>
+          </a:lnRef>
+          <a:fillRef idx="0">
+            <a:schemeClr val="accent1"/>
+          </a:fillRef>
+          <a:effectRef idx="0">
+            <a:schemeClr val="accent1"/>
+          </a:effectRef>
+          <a:fontRef idx="minor">
+            <a:schemeClr val="tx1"/>
+          </a:fontRef>
+        </p:style>
+      </p:cxnSp>
+      <p:grpSp>
+        <p:nvGrpSpPr>
+          <p:cNvPr id="30" name="Group 29">
+            <a:extLst>
+              <a:ext uri="{FF2B5EF4-FFF2-40B4-BE49-F238E27FC236}">
+                <a16:creationId xmlns:a16="http://schemas.microsoft.com/office/drawing/2014/main" id="{1DFB7BC2-A427-E4E1-8B4C-18BF8BF1CF83}"/>
+              </a:ext>
+            </a:extLst>
+          </p:cNvPr>
+          <p:cNvGrpSpPr/>
+          <p:nvPr/>
+        </p:nvGrpSpPr>
+        <p:grpSpPr>
+          <a:xfrm>
+            <a:off x="2399461" y="3733457"/>
+            <a:ext cx="2338825" cy="422143"/>
+            <a:chOff x="1548561" y="3561521"/>
+            <a:chExt cx="2325777" cy="417129"/>
+          </a:xfrm>
+        </p:grpSpPr>
+        <p:sp>
+          <p:nvSpPr>
+            <p:cNvPr id="31" name="Rounded Rectangle 30">
+              <a:extLst>
+                <a:ext uri="{FF2B5EF4-FFF2-40B4-BE49-F238E27FC236}">
+                  <a16:creationId xmlns:a16="http://schemas.microsoft.com/office/drawing/2014/main" id="{6B0E3C91-6700-AC35-773B-E64EE407FD76}"/>
+                </a:ext>
+              </a:extLst>
+            </p:cNvPr>
+            <p:cNvSpPr/>
+            <p:nvPr/>
+          </p:nvSpPr>
+          <p:spPr>
+            <a:xfrm>
+              <a:off x="1548561" y="3561521"/>
+              <a:ext cx="2325777" cy="417129"/>
+            </a:xfrm>
+            <a:prstGeom prst="roundRect">
+              <a:avLst/>
+            </a:prstGeom>
+            <a:noFill/>
+          </p:spPr>
+          <p:style>
+            <a:lnRef idx="2">
+              <a:schemeClr val="accent1">
+                <a:shade val="50000"/>
+              </a:schemeClr>
+            </a:lnRef>
+            <a:fillRef idx="1">
+              <a:schemeClr val="accent1"/>
+            </a:fillRef>
+            <a:effectRef idx="0">
+              <a:schemeClr val="accent1"/>
+            </a:effectRef>
+            <a:fontRef idx="minor">
+              <a:schemeClr val="lt1"/>
+            </a:fontRef>
+          </p:style>
+          <p:txBody>
+            <a:bodyPr rtlCol="0" anchor="ctr"/>
+            <a:lstStyle/>
+            <a:p>
+              <a:pPr algn="ctr"/>
+              <a:endParaRPr lang="en-US" sz="1400"/>
+            </a:p>
+          </p:txBody>
+        </p:sp>
+        <p:sp>
+          <p:nvSpPr>
+            <p:cNvPr id="32" name="TextBox 31">
+              <a:extLst>
+                <a:ext uri="{FF2B5EF4-FFF2-40B4-BE49-F238E27FC236}">
+                  <a16:creationId xmlns:a16="http://schemas.microsoft.com/office/drawing/2014/main" id="{3494669E-3F3D-AA4F-BFD7-A8010892901E}"/>
+                </a:ext>
+              </a:extLst>
+            </p:cNvPr>
+            <p:cNvSpPr txBox="1"/>
+            <p:nvPr/>
+          </p:nvSpPr>
+          <p:spPr>
+            <a:xfrm>
+              <a:off x="1705723" y="3628144"/>
+              <a:ext cx="2011452" cy="258503"/>
+            </a:xfrm>
+            <a:prstGeom prst="rect">
+              <a:avLst/>
+            </a:prstGeom>
+            <a:noFill/>
+          </p:spPr>
+          <p:txBody>
+            <a:bodyPr wrap="square" rtlCol="0">
+              <a:spAutoFit/>
+            </a:bodyPr>
+            <a:lstStyle/>
+            <a:p>
+              <a:r>
+                <a:rPr lang="en-US" sz="1050" dirty="0"/>
+                <a:t>Producer adjusts the list </a:t>
+              </a:r>
+            </a:p>
+          </p:txBody>
+        </p:sp>
+      </p:grpSp>
+      <p:cxnSp>
+        <p:nvCxnSpPr>
+          <p:cNvPr id="33" name="Elbow Connector 32">
+            <a:extLst>
+              <a:ext uri="{FF2B5EF4-FFF2-40B4-BE49-F238E27FC236}">
+                <a16:creationId xmlns:a16="http://schemas.microsoft.com/office/drawing/2014/main" id="{B71A2B99-811E-40FC-55E1-C5FA4F36E1B2}"/>
+              </a:ext>
+            </a:extLst>
+          </p:cNvPr>
+          <p:cNvCxnSpPr>
+            <a:cxnSpLocks/>
+            <a:stCxn id="27" idx="1"/>
+            <a:endCxn id="31" idx="3"/>
+          </p:cNvCxnSpPr>
+          <p:nvPr/>
+        </p:nvCxnSpPr>
+        <p:spPr>
+          <a:xfrm rot="10800000" flipV="1">
+            <a:off x="4738286" y="3904099"/>
+            <a:ext cx="3070626" cy="40429"/>
+          </a:xfrm>
+          <a:prstGeom prst="bentConnector3">
+            <a:avLst>
+              <a:gd name="adj1" fmla="val 50000"/>
+            </a:avLst>
+          </a:prstGeom>
+          <a:ln>
+            <a:tailEnd type="triangle"/>
+          </a:ln>
+        </p:spPr>
+        <p:style>
+          <a:lnRef idx="1">
+            <a:schemeClr val="accent1"/>
+          </a:lnRef>
+          <a:fillRef idx="0">
+            <a:schemeClr val="accent1"/>
+          </a:fillRef>
+          <a:effectRef idx="0">
+            <a:schemeClr val="accent1"/>
+          </a:effectRef>
+          <a:fontRef idx="minor">
+            <a:schemeClr val="tx1"/>
+          </a:fontRef>
+        </p:style>
+      </p:cxnSp>
+      <p:sp>
+        <p:nvSpPr>
+          <p:cNvPr id="34" name="TextBox 33">
+            <a:extLst>
+              <a:ext uri="{FF2B5EF4-FFF2-40B4-BE49-F238E27FC236}">
+                <a16:creationId xmlns:a16="http://schemas.microsoft.com/office/drawing/2014/main" id="{7FD09B82-29D6-1BFE-C11E-A9BF0BCB2DE7}"/>
+              </a:ext>
+            </a:extLst>
+          </p:cNvPr>
+          <p:cNvSpPr txBox="1"/>
+          <p:nvPr/>
+        </p:nvSpPr>
+        <p:spPr>
+          <a:xfrm>
+            <a:off x="4889498" y="2912271"/>
+            <a:ext cx="2669191" cy="430887"/>
+          </a:xfrm>
+          <a:prstGeom prst="rect">
+            <a:avLst/>
+          </a:prstGeom>
+          <a:noFill/>
+        </p:spPr>
+        <p:txBody>
+          <a:bodyPr wrap="square" rtlCol="0">
+            <a:spAutoFit/>
+          </a:bodyPr>
+          <a:lstStyle/>
+          <a:p>
+            <a:r>
+              <a:rPr lang="en-US" sz="1100" dirty="0"/>
+              <a:t>Producer notifies of changes to list to consumer</a:t>
+            </a:r>
+          </a:p>
+        </p:txBody>
+      </p:sp>
+      <p:sp>
+        <p:nvSpPr>
+          <p:cNvPr id="35" name="Oval 34">
+            <a:extLst>
+              <a:ext uri="{FF2B5EF4-FFF2-40B4-BE49-F238E27FC236}">
+                <a16:creationId xmlns:a16="http://schemas.microsoft.com/office/drawing/2014/main" id="{2EFEB2AF-F7A7-CB01-FEAC-9CF9E959D56F}"/>
+              </a:ext>
+            </a:extLst>
+          </p:cNvPr>
+          <p:cNvSpPr/>
+          <p:nvPr/>
+        </p:nvSpPr>
+        <p:spPr>
+          <a:xfrm>
+            <a:off x="6034087" y="2651313"/>
+            <a:ext cx="277594" cy="311476"/>
+          </a:xfrm>
+          <a:prstGeom prst="ellipse">
+            <a:avLst/>
+          </a:prstGeom>
+          <a:solidFill>
+            <a:srgbClr val="FFFF00"/>
+          </a:solidFill>
+        </p:spPr>
+        <p:style>
+          <a:lnRef idx="2">
+            <a:schemeClr val="accent1">
+              <a:shade val="50000"/>
+            </a:schemeClr>
+          </a:lnRef>
+          <a:fillRef idx="1">
+            <a:schemeClr val="accent1"/>
+          </a:fillRef>
+          <a:effectRef idx="0">
+            <a:schemeClr val="accent1"/>
+          </a:effectRef>
+          <a:fontRef idx="minor">
+            <a:schemeClr val="lt1"/>
+          </a:fontRef>
+        </p:style>
+        <p:txBody>
+          <a:bodyPr rtlCol="0" anchor="ctr"/>
+          <a:lstStyle/>
+          <a:p>
+            <a:pPr algn="ctr"/>
+            <a:r>
+              <a:rPr lang="en-US" sz="1400" dirty="0">
+                <a:solidFill>
+                  <a:schemeClr val="tx1"/>
+                </a:solidFill>
+              </a:rPr>
+              <a:t>3</a:t>
+            </a:r>
+          </a:p>
+        </p:txBody>
+      </p:sp>
+      <p:sp>
+        <p:nvSpPr>
+          <p:cNvPr id="36" name="Oval 35">
+            <a:extLst>
+              <a:ext uri="{FF2B5EF4-FFF2-40B4-BE49-F238E27FC236}">
+                <a16:creationId xmlns:a16="http://schemas.microsoft.com/office/drawing/2014/main" id="{4BC5F07C-0D87-22A6-108B-26E4FA86BE67}"/>
+              </a:ext>
+            </a:extLst>
+          </p:cNvPr>
+          <p:cNvSpPr/>
+          <p:nvPr/>
+        </p:nvSpPr>
+        <p:spPr>
+          <a:xfrm>
+            <a:off x="6034087" y="3666977"/>
+            <a:ext cx="277594" cy="311476"/>
+          </a:xfrm>
+          <a:prstGeom prst="ellipse">
+            <a:avLst/>
+          </a:prstGeom>
+          <a:solidFill>
+            <a:srgbClr val="FFFF00"/>
+          </a:solidFill>
+        </p:spPr>
+        <p:style>
+          <a:lnRef idx="2">
+            <a:schemeClr val="accent1">
+              <a:shade val="50000"/>
+            </a:schemeClr>
+          </a:lnRef>
+          <a:fillRef idx="1">
+            <a:schemeClr val="accent1"/>
+          </a:fillRef>
+          <a:effectRef idx="0">
+            <a:schemeClr val="accent1"/>
+          </a:effectRef>
+          <a:fontRef idx="minor">
+            <a:schemeClr val="lt1"/>
+          </a:fontRef>
+        </p:style>
+        <p:txBody>
+          <a:bodyPr rtlCol="0" anchor="ctr"/>
+          <a:lstStyle/>
+          <a:p>
+            <a:pPr algn="ctr"/>
+            <a:r>
+              <a:rPr lang="en-US" sz="1400" dirty="0">
+                <a:solidFill>
+                  <a:schemeClr val="tx1"/>
+                </a:solidFill>
+              </a:rPr>
+              <a:t>4</a:t>
+            </a:r>
+          </a:p>
+        </p:txBody>
+      </p:sp>
+      <p:sp>
+        <p:nvSpPr>
+          <p:cNvPr id="37" name="TextBox 36">
+            <a:extLst>
+              <a:ext uri="{FF2B5EF4-FFF2-40B4-BE49-F238E27FC236}">
+                <a16:creationId xmlns:a16="http://schemas.microsoft.com/office/drawing/2014/main" id="{08C078FE-7E81-1DE5-36AE-FFED13052624}"/>
+              </a:ext>
+            </a:extLst>
+          </p:cNvPr>
+          <p:cNvSpPr txBox="1"/>
+          <p:nvPr/>
+        </p:nvSpPr>
+        <p:spPr>
+          <a:xfrm>
+            <a:off x="4868110" y="3948080"/>
+            <a:ext cx="2669191" cy="430887"/>
+          </a:xfrm>
+          <a:prstGeom prst="rect">
+            <a:avLst/>
+          </a:prstGeom>
+          <a:noFill/>
+        </p:spPr>
+        <p:txBody>
+          <a:bodyPr wrap="square" rtlCol="0">
+            <a:spAutoFit/>
+          </a:bodyPr>
+          <a:lstStyle/>
+          <a:p>
+            <a:r>
+              <a:rPr lang="en-US" sz="1100" dirty="0"/>
+              <a:t>Consumer requests add/modify or delete of a member</a:t>
+            </a:r>
+          </a:p>
+        </p:txBody>
+      </p:sp>
+      <p:grpSp>
+        <p:nvGrpSpPr>
+          <p:cNvPr id="38" name="Group 37">
+            <a:extLst>
+              <a:ext uri="{FF2B5EF4-FFF2-40B4-BE49-F238E27FC236}">
+                <a16:creationId xmlns:a16="http://schemas.microsoft.com/office/drawing/2014/main" id="{E7F6EE02-047A-1036-1687-C654EAE9A331}"/>
+              </a:ext>
+            </a:extLst>
+          </p:cNvPr>
+          <p:cNvGrpSpPr/>
+          <p:nvPr/>
+        </p:nvGrpSpPr>
+        <p:grpSpPr>
+          <a:xfrm>
+            <a:off x="2399461" y="4617008"/>
+            <a:ext cx="2338825" cy="422143"/>
+            <a:chOff x="1548561" y="3561521"/>
+            <a:chExt cx="2325777" cy="417129"/>
+          </a:xfrm>
+        </p:grpSpPr>
+        <p:sp>
+          <p:nvSpPr>
+            <p:cNvPr id="39" name="Rounded Rectangle 38">
+              <a:extLst>
+                <a:ext uri="{FF2B5EF4-FFF2-40B4-BE49-F238E27FC236}">
+                  <a16:creationId xmlns:a16="http://schemas.microsoft.com/office/drawing/2014/main" id="{3B8D82CC-0A32-3995-43A8-F9F3C5F62084}"/>
+                </a:ext>
+              </a:extLst>
+            </p:cNvPr>
+            <p:cNvSpPr/>
+            <p:nvPr/>
+          </p:nvSpPr>
+          <p:spPr>
+            <a:xfrm>
+              <a:off x="1548561" y="3561521"/>
+              <a:ext cx="2325777" cy="417129"/>
+            </a:xfrm>
+            <a:prstGeom prst="roundRect">
+              <a:avLst/>
+            </a:prstGeom>
+            <a:noFill/>
+          </p:spPr>
+          <p:style>
+            <a:lnRef idx="2">
+              <a:schemeClr val="accent1">
+                <a:shade val="50000"/>
+              </a:schemeClr>
+            </a:lnRef>
+            <a:fillRef idx="1">
+              <a:schemeClr val="accent1"/>
+            </a:fillRef>
+            <a:effectRef idx="0">
+              <a:schemeClr val="accent1"/>
+            </a:effectRef>
+            <a:fontRef idx="minor">
+              <a:schemeClr val="lt1"/>
+            </a:fontRef>
+          </p:style>
+          <p:txBody>
+            <a:bodyPr rtlCol="0" anchor="ctr"/>
+            <a:lstStyle/>
+            <a:p>
+              <a:pPr algn="ctr"/>
+              <a:endParaRPr lang="en-US" sz="1400"/>
+            </a:p>
+          </p:txBody>
+        </p:sp>
+        <p:sp>
+          <p:nvSpPr>
+            <p:cNvPr id="40" name="TextBox 39">
+              <a:extLst>
+                <a:ext uri="{FF2B5EF4-FFF2-40B4-BE49-F238E27FC236}">
+                  <a16:creationId xmlns:a16="http://schemas.microsoft.com/office/drawing/2014/main" id="{503C887B-326C-0F90-69DB-EA97CD09EF5E}"/>
+                </a:ext>
+              </a:extLst>
+            </p:cNvPr>
+            <p:cNvSpPr txBox="1"/>
+            <p:nvPr/>
+          </p:nvSpPr>
+          <p:spPr>
+            <a:xfrm>
+              <a:off x="1705723" y="3628144"/>
+              <a:ext cx="2011452" cy="258503"/>
+            </a:xfrm>
+            <a:prstGeom prst="rect">
+              <a:avLst/>
+            </a:prstGeom>
+            <a:noFill/>
+          </p:spPr>
+          <p:txBody>
+            <a:bodyPr wrap="square" rtlCol="0">
+              <a:spAutoFit/>
+            </a:bodyPr>
+            <a:lstStyle/>
+            <a:p>
+              <a:r>
+                <a:rPr lang="en-US" sz="1050" dirty="0"/>
+                <a:t>Producer adjusts the list </a:t>
+              </a:r>
+            </a:p>
+          </p:txBody>
+        </p:sp>
+      </p:grpSp>
+      <p:grpSp>
+        <p:nvGrpSpPr>
+          <p:cNvPr id="41" name="Group 40">
+            <a:extLst>
+              <a:ext uri="{FF2B5EF4-FFF2-40B4-BE49-F238E27FC236}">
+                <a16:creationId xmlns:a16="http://schemas.microsoft.com/office/drawing/2014/main" id="{9BB961E2-C37C-B536-85BF-79AB0214B4D3}"/>
+              </a:ext>
+            </a:extLst>
+          </p:cNvPr>
+          <p:cNvGrpSpPr/>
+          <p:nvPr/>
+        </p:nvGrpSpPr>
+        <p:grpSpPr>
+          <a:xfrm>
+            <a:off x="7795417" y="4570482"/>
+            <a:ext cx="4010172" cy="690908"/>
+            <a:chOff x="1548561" y="3561521"/>
+            <a:chExt cx="3987800" cy="682702"/>
+          </a:xfrm>
+        </p:grpSpPr>
+        <p:sp>
+          <p:nvSpPr>
+            <p:cNvPr id="42" name="Rounded Rectangle 41">
+              <a:extLst>
+                <a:ext uri="{FF2B5EF4-FFF2-40B4-BE49-F238E27FC236}">
+                  <a16:creationId xmlns:a16="http://schemas.microsoft.com/office/drawing/2014/main" id="{DB6F025B-2AD2-AEB9-7B05-BCF279E38F6E}"/>
+                </a:ext>
+              </a:extLst>
+            </p:cNvPr>
+            <p:cNvSpPr/>
+            <p:nvPr/>
+          </p:nvSpPr>
+          <p:spPr>
+            <a:xfrm>
+              <a:off x="1548561" y="3561521"/>
+              <a:ext cx="3987800" cy="682702"/>
+            </a:xfrm>
+            <a:prstGeom prst="roundRect">
+              <a:avLst/>
+            </a:prstGeom>
+            <a:noFill/>
+          </p:spPr>
+          <p:style>
+            <a:lnRef idx="2">
+              <a:schemeClr val="accent1">
+                <a:shade val="50000"/>
+              </a:schemeClr>
+            </a:lnRef>
+            <a:fillRef idx="1">
+              <a:schemeClr val="accent1"/>
+            </a:fillRef>
+            <a:effectRef idx="0">
+              <a:schemeClr val="accent1"/>
+            </a:effectRef>
+            <a:fontRef idx="minor">
+              <a:schemeClr val="lt1"/>
+            </a:fontRef>
+          </p:style>
+          <p:txBody>
+            <a:bodyPr rtlCol="0" anchor="ctr"/>
+            <a:lstStyle/>
+            <a:p>
+              <a:pPr algn="ctr"/>
+              <a:endParaRPr lang="en-US" sz="1400"/>
+            </a:p>
+          </p:txBody>
+        </p:sp>
+        <p:sp>
+          <p:nvSpPr>
+            <p:cNvPr id="43" name="TextBox 42">
+              <a:extLst>
+                <a:ext uri="{FF2B5EF4-FFF2-40B4-BE49-F238E27FC236}">
+                  <a16:creationId xmlns:a16="http://schemas.microsoft.com/office/drawing/2014/main" id="{C091D8EC-0817-9056-E32B-F6FD72284802}"/>
+                </a:ext>
+              </a:extLst>
+            </p:cNvPr>
+            <p:cNvSpPr txBox="1"/>
+            <p:nvPr/>
+          </p:nvSpPr>
+          <p:spPr>
+            <a:xfrm>
+              <a:off x="1705722" y="3628144"/>
+              <a:ext cx="3668713" cy="250900"/>
+            </a:xfrm>
+            <a:prstGeom prst="rect">
+              <a:avLst/>
+            </a:prstGeom>
+            <a:noFill/>
+          </p:spPr>
+          <p:txBody>
+            <a:bodyPr wrap="square" rtlCol="0">
+              <a:spAutoFit/>
+            </a:bodyPr>
+            <a:lstStyle/>
+            <a:p>
+              <a:r>
+                <a:rPr lang="en-US" sz="1050" dirty="0"/>
+                <a:t>Identify changes to the Attribution List (Add/Modify/Delete)</a:t>
+              </a:r>
+            </a:p>
+          </p:txBody>
+        </p:sp>
+      </p:grpSp>
+      <p:cxnSp>
+        <p:nvCxnSpPr>
+          <p:cNvPr id="44" name="Connector: Elbow 48">
+            <a:extLst>
+              <a:ext uri="{FF2B5EF4-FFF2-40B4-BE49-F238E27FC236}">
+                <a16:creationId xmlns:a16="http://schemas.microsoft.com/office/drawing/2014/main" id="{F2BC26C0-B950-CAF5-12AE-BF58AAE1028B}"/>
+              </a:ext>
+            </a:extLst>
+          </p:cNvPr>
+          <p:cNvCxnSpPr>
+            <a:cxnSpLocks/>
+            <a:stCxn id="39" idx="3"/>
+            <a:endCxn id="42" idx="1"/>
+          </p:cNvCxnSpPr>
+          <p:nvPr/>
+        </p:nvCxnSpPr>
+        <p:spPr>
+          <a:xfrm>
+            <a:off x="4738286" y="4828080"/>
+            <a:ext cx="3057131" cy="87856"/>
+          </a:xfrm>
+          <a:prstGeom prst="bentConnector3">
+            <a:avLst>
+              <a:gd name="adj1" fmla="val 50000"/>
+            </a:avLst>
+          </a:prstGeom>
+          <a:ln w="9525" cap="flat" cmpd="sng" algn="ctr">
+            <a:solidFill>
+              <a:schemeClr val="accent1"/>
+            </a:solidFill>
+            <a:prstDash val="solid"/>
+            <a:round/>
+            <a:headEnd type="arrow" w="med" len="med"/>
+            <a:tailEnd type="arrow" w="med" len="med"/>
+          </a:ln>
+        </p:spPr>
+        <p:style>
+          <a:lnRef idx="0">
+            <a:scrgbClr r="0" g="0" b="0"/>
+          </a:lnRef>
+          <a:fillRef idx="0">
+            <a:scrgbClr r="0" g="0" b="0"/>
+          </a:fillRef>
+          <a:effectRef idx="0">
+            <a:scrgbClr r="0" g="0" b="0"/>
+          </a:effectRef>
+          <a:fontRef idx="minor">
+            <a:schemeClr val="tx1"/>
+          </a:fontRef>
+        </p:style>
+      </p:cxnSp>
+      <p:sp>
+        <p:nvSpPr>
+          <p:cNvPr id="45" name="Oval 44">
+            <a:extLst>
+              <a:ext uri="{FF2B5EF4-FFF2-40B4-BE49-F238E27FC236}">
+                <a16:creationId xmlns:a16="http://schemas.microsoft.com/office/drawing/2014/main" id="{82009A6B-3066-F93E-7222-E924DF8238F5}"/>
+              </a:ext>
+            </a:extLst>
+          </p:cNvPr>
+          <p:cNvSpPr/>
+          <p:nvPr/>
+        </p:nvSpPr>
+        <p:spPr>
+          <a:xfrm>
+            <a:off x="6034087" y="4596750"/>
+            <a:ext cx="277594" cy="311476"/>
+          </a:xfrm>
+          <a:prstGeom prst="ellipse">
+            <a:avLst/>
+          </a:prstGeom>
+          <a:solidFill>
+            <a:srgbClr val="FFFF00"/>
+          </a:solidFill>
+        </p:spPr>
+        <p:style>
+          <a:lnRef idx="2">
+            <a:schemeClr val="accent1">
+              <a:shade val="50000"/>
+            </a:schemeClr>
+          </a:lnRef>
+          <a:fillRef idx="1">
+            <a:schemeClr val="accent1"/>
+          </a:fillRef>
+          <a:effectRef idx="0">
+            <a:schemeClr val="accent1"/>
+          </a:effectRef>
+          <a:fontRef idx="minor">
+            <a:schemeClr val="lt1"/>
+          </a:fontRef>
+        </p:style>
+        <p:txBody>
+          <a:bodyPr rtlCol="0" anchor="ctr"/>
+          <a:lstStyle/>
+          <a:p>
+            <a:pPr algn="ctr"/>
+            <a:r>
+              <a:rPr lang="en-US" sz="1400" dirty="0">
+                <a:solidFill>
+                  <a:schemeClr val="tx1"/>
+                </a:solidFill>
+              </a:rPr>
+              <a:t>5</a:t>
+            </a:r>
+          </a:p>
+        </p:txBody>
+      </p:sp>
+      <p:sp>
+        <p:nvSpPr>
+          <p:cNvPr id="46" name="TextBox 45">
+            <a:extLst>
+              <a:ext uri="{FF2B5EF4-FFF2-40B4-BE49-F238E27FC236}">
+                <a16:creationId xmlns:a16="http://schemas.microsoft.com/office/drawing/2014/main" id="{CFA749EB-1941-85AE-0104-8DA825DA2BF0}"/>
+              </a:ext>
+            </a:extLst>
+          </p:cNvPr>
+          <p:cNvSpPr txBox="1"/>
+          <p:nvPr/>
+        </p:nvSpPr>
+        <p:spPr>
+          <a:xfrm>
+            <a:off x="5038253" y="4877797"/>
+            <a:ext cx="2280434" cy="430887"/>
+          </a:xfrm>
+          <a:prstGeom prst="rect">
+            <a:avLst/>
+          </a:prstGeom>
+          <a:noFill/>
+        </p:spPr>
+        <p:txBody>
+          <a:bodyPr wrap="square" rtlCol="0">
+            <a:spAutoFit/>
+          </a:bodyPr>
+          <a:lstStyle/>
+          <a:p>
+            <a:r>
+              <a:rPr lang="en-US" sz="1100" dirty="0"/>
+              <a:t>Producer and Consumers agree on a reconciled list</a:t>
+            </a:r>
+          </a:p>
+        </p:txBody>
+      </p:sp>
+      <p:sp>
+        <p:nvSpPr>
+          <p:cNvPr id="47" name="TextBox 46">
+            <a:extLst>
+              <a:ext uri="{FF2B5EF4-FFF2-40B4-BE49-F238E27FC236}">
+                <a16:creationId xmlns:a16="http://schemas.microsoft.com/office/drawing/2014/main" id="{52E99C28-61D9-531C-9030-CBEB2F14DAE0}"/>
+              </a:ext>
+            </a:extLst>
+          </p:cNvPr>
+          <p:cNvSpPr txBox="1"/>
+          <p:nvPr/>
+        </p:nvSpPr>
+        <p:spPr>
+          <a:xfrm>
+            <a:off x="260394" y="4389276"/>
+            <a:ext cx="1956633" cy="738664"/>
+          </a:xfrm>
+          <a:prstGeom prst="rect">
+            <a:avLst/>
+          </a:prstGeom>
+          <a:noFill/>
+        </p:spPr>
+        <p:txBody>
+          <a:bodyPr wrap="square" rtlCol="0">
+            <a:spAutoFit/>
+          </a:bodyPr>
+          <a:lstStyle/>
+          <a:p>
+            <a:r>
+              <a:rPr lang="en-US" sz="1400" dirty="0"/>
+              <a:t>Note: Steps 3 and 4 are repeated as many times as needed.</a:t>
+            </a:r>
+          </a:p>
+        </p:txBody>
+      </p:sp>
+    </p:spTree>
+    <p:extLst>
+      <p:ext uri="{BB962C8B-B14F-4D97-AF65-F5344CB8AC3E}">
+        <p14:creationId xmlns:p14="http://schemas.microsoft.com/office/powerpoint/2010/main" val="3956496123"/>
       </p:ext>
     </p:extLst>
   </p:cSld>

</xml_diff>